<commit_message>
changes to progress report wk 2
</commit_message>
<xml_diff>
--- a/navigation/jibebe_week_two_progress.pptx
+++ b/navigation/jibebe_week_two_progress.pptx
@@ -10,6 +10,7 @@
     <p:sldId id="258" r:id="rId5"/>
     <p:sldId id="259" r:id="rId6"/>
     <p:sldId id="260" r:id="rId7"/>
+    <p:sldId id="261" r:id="rId8"/>
   </p:sldIdLst>
   <p:sldSz cx="12192000" cy="6858000"/>
   <p:notesSz cx="12192000" cy="6858000"/>
@@ -13928,7 +13929,9 @@
         </p:nvSpPr>
         <p:spPr bwMode="auto"/>
         <p:txBody>
-          <a:bodyPr/>
+          <a:bodyPr vertOverflow="overflow" horzOverflow="overflow" vert="horz" wrap="square" lIns="91440" tIns="45720" rIns="91440" bIns="45720" numCol="1" spcCol="0" rtlCol="0" fromWordArt="0" anchor="t" anchorCtr="0" forceAA="0" upright="0" compatLnSpc="0">
+            <a:normAutofit fontScale="90000" lnSpcReduction="2000"/>
+          </a:bodyPr>
           <a:lstStyle/>
           <a:p>
             <a:pPr>
@@ -13947,6 +13950,97 @@
             <a:r>
               <a:rPr lang="en-US"/>
               <a:t>Hence for the following week progress will be made on the positioning of the robot as the initial instruction and replacement of the obstacle avoidance ultrasonic sensor with the computer vision sensor.</a:t>
+            </a:r>
+            <a:endParaRPr lang="en-US"/>
+          </a:p>
+          <a:p>
+            <a:pPr>
+              <a:defRPr/>
+            </a:pPr>
+            <a:endParaRPr/>
+          </a:p>
+          <a:p>
+            <a:pPr>
+              <a:defRPr/>
+            </a:pPr>
+            <a:r>
+              <a:rPr sz="1100" b="0" i="0" u="sng">
+                <a:solidFill>
+                  <a:srgbClr val="000000"/>
+                </a:solidFill>
+                <a:latin typeface="Arial"/>
+                <a:ea typeface="Arial"/>
+                <a:cs typeface="Arial"/>
+              </a:rPr>
+              <a:t>Challenges</a:t>
+            </a:r>
+            <a:endParaRPr/>
+          </a:p>
+          <a:p>
+            <a:pPr>
+              <a:defRPr/>
+            </a:pPr>
+            <a:r>
+              <a:rPr sz="1100" b="0" i="0" u="none">
+                <a:solidFill>
+                  <a:srgbClr val="000000"/>
+                </a:solidFill>
+                <a:latin typeface="Arial"/>
+                <a:ea typeface="Arial"/>
+                <a:cs typeface="Arial"/>
+              </a:rPr>
+              <a:t>We could not work with the gps as the magnetometer was missing</a:t>
+            </a:r>
+            <a:endParaRPr/>
+          </a:p>
+          <a:p>
+            <a:pPr>
+              <a:defRPr/>
+            </a:pPr>
+            <a:r>
+              <a:rPr sz="1100" b="0" i="0" u="none">
+                <a:solidFill>
+                  <a:srgbClr val="000000"/>
+                </a:solidFill>
+                <a:latin typeface="Arial"/>
+                <a:ea typeface="Arial"/>
+                <a:cs typeface="Arial"/>
+              </a:rPr>
+              <a:t>We realised the ultrasonic sensor could not work in the area of application.</a:t>
+            </a:r>
+            <a:endParaRPr/>
+          </a:p>
+          <a:p>
+            <a:pPr>
+              <a:defRPr/>
+            </a:pPr>
+            <a:r>
+              <a:rPr sz="1100" b="0" i="0" u="none">
+                <a:solidFill>
+                  <a:srgbClr val="000000"/>
+                </a:solidFill>
+                <a:latin typeface="Arial"/>
+                <a:ea typeface="Arial"/>
+                <a:cs typeface="Arial"/>
+              </a:rPr>
+              <a:t>A more appropriate obstacle detection device would be a camera.</a:t>
+            </a:r>
+            <a:endParaRPr/>
+          </a:p>
+          <a:p>
+            <a:pPr>
+              <a:defRPr/>
+            </a:pPr>
+            <a:r>
+              <a:rPr sz="1100" b="0" i="0" u="none">
+                <a:solidFill>
+                  <a:srgbClr val="000000"/>
+                </a:solidFill>
+                <a:latin typeface="Arial"/>
+                <a:ea typeface="Arial"/>
+                <a:cs typeface="Arial"/>
+              </a:rPr>
+              <a:t>Power. For testing we used a power adapter which limited the robots movement. Rechargeable would be more suited to the task.</a:t>
             </a:r>
             <a:endParaRPr lang="en-US"/>
           </a:p>
@@ -13980,6 +14074,184 @@
 </file>
 
 <file path=ppt/slides/slide5.xml><?xml version="1.0" encoding="utf-8"?>
+<p:sld xmlns:a="http://schemas.openxmlformats.org/drawingml/2006/main" xmlns:r="http://schemas.openxmlformats.org/officeDocument/2006/relationships" xmlns:p="http://schemas.openxmlformats.org/presentationml/2006/main" xmlns:m="http://schemas.openxmlformats.org/officeDocument/2006/math" xmlns:w="http://schemas.openxmlformats.org/wordprocessingml/2006/main" showMasterPhAnim="0" show="1">
+  <p:cSld name="">
+    <p:spTree>
+      <p:nvGrpSpPr>
+        <p:cNvPr id="1" name=""/>
+        <p:cNvGrpSpPr/>
+        <p:nvPr/>
+      </p:nvGrpSpPr>
+      <p:grpSpPr bwMode="auto">
+        <a:xfrm>
+          <a:off x="0" y="0"/>
+          <a:ext cx="0" cy="0"/>
+          <a:chOff x="0" y="0"/>
+          <a:chExt cx="0" cy="0"/>
+        </a:xfrm>
+      </p:grpSpPr>
+      <p:sp>
+        <p:nvSpPr>
+          <p:cNvPr id="1549568754" name="Title 1"/>
+          <p:cNvSpPr>
+            <a:spLocks noGrp="1"/>
+          </p:cNvSpPr>
+          <p:nvPr>
+            <p:ph type="title"/>
+          </p:nvPr>
+        </p:nvSpPr>
+        <p:spPr bwMode="auto"/>
+        <p:txBody>
+          <a:bodyPr/>
+          <a:lstStyle/>
+          <a:p>
+            <a:pPr>
+              <a:defRPr/>
+            </a:pPr>
+            <a:r>
+              <a:rPr/>
+              <a:t>Challenges</a:t>
+            </a:r>
+            <a:endParaRPr/>
+          </a:p>
+        </p:txBody>
+      </p:sp>
+      <p:sp>
+        <p:nvSpPr>
+          <p:cNvPr id="1263787648" name="Content Placeholder 2"/>
+          <p:cNvSpPr>
+            <a:spLocks noGrp="1"/>
+          </p:cNvSpPr>
+          <p:nvPr>
+            <p:ph idx="1"/>
+          </p:nvPr>
+        </p:nvSpPr>
+        <p:spPr bwMode="auto">
+          <a:xfrm>
+            <a:off x="1154953" y="2603499"/>
+            <a:ext cx="8825658" cy="3416299"/>
+          </a:xfrm>
+        </p:spPr>
+        <p:txBody>
+          <a:bodyPr/>
+          <a:lstStyle/>
+          <a:p>
+            <a:pPr>
+              <a:defRPr/>
+            </a:pPr>
+            <a:endParaRPr/>
+          </a:p>
+          <a:p>
+            <a:pPr marL="0" indent="0">
+              <a:buClr>
+                <a:schemeClr val="accent1"/>
+              </a:buClr>
+              <a:buSzPct val="80000"/>
+              <a:buFont typeface="Wingdings 3"/>
+              <a:buNone/>
+              <a:defRPr/>
+            </a:pPr>
+            <a:endParaRPr/>
+          </a:p>
+          <a:p>
+            <a:pPr>
+              <a:defRPr/>
+            </a:pPr>
+            <a:r>
+              <a:rPr sz="2000" b="0" i="0" u="none">
+                <a:solidFill>
+                  <a:srgbClr val="000000"/>
+                </a:solidFill>
+                <a:latin typeface="Times New Roman"/>
+                <a:ea typeface="Arial"/>
+                <a:cs typeface="Times New Roman"/>
+              </a:rPr>
+              <a:t>We could not work with the gps as the magnetometer was missing</a:t>
+            </a:r>
+            <a:endParaRPr sz="2000">
+              <a:latin typeface="Times New Roman"/>
+              <a:cs typeface="Times New Roman"/>
+            </a:endParaRPr>
+          </a:p>
+          <a:p>
+            <a:pPr>
+              <a:defRPr/>
+            </a:pPr>
+            <a:r>
+              <a:rPr sz="2000" b="0" i="0" u="none">
+                <a:solidFill>
+                  <a:srgbClr val="000000"/>
+                </a:solidFill>
+                <a:latin typeface="Times New Roman"/>
+                <a:ea typeface="Arial"/>
+                <a:cs typeface="Times New Roman"/>
+              </a:rPr>
+              <a:t>We realised the ultrasonic sensor could not work in the area of application.</a:t>
+            </a:r>
+            <a:endParaRPr sz="2000">
+              <a:latin typeface="Times New Roman"/>
+              <a:cs typeface="Times New Roman"/>
+            </a:endParaRPr>
+          </a:p>
+          <a:p>
+            <a:pPr>
+              <a:defRPr/>
+            </a:pPr>
+            <a:r>
+              <a:rPr sz="2000" b="0" i="0" u="none">
+                <a:solidFill>
+                  <a:srgbClr val="000000"/>
+                </a:solidFill>
+                <a:latin typeface="Times New Roman"/>
+                <a:ea typeface="Arial"/>
+                <a:cs typeface="Times New Roman"/>
+              </a:rPr>
+              <a:t>A more appropriate obstacle detection device would be a camera.</a:t>
+            </a:r>
+            <a:endParaRPr sz="2000">
+              <a:latin typeface="Times New Roman"/>
+              <a:cs typeface="Times New Roman"/>
+            </a:endParaRPr>
+          </a:p>
+          <a:p>
+            <a:pPr>
+              <a:defRPr/>
+            </a:pPr>
+            <a:r>
+              <a:rPr sz="2000" b="0" i="0" u="none">
+                <a:solidFill>
+                  <a:srgbClr val="000000"/>
+                </a:solidFill>
+                <a:latin typeface="Times New Roman"/>
+                <a:ea typeface="Arial"/>
+                <a:cs typeface="Times New Roman"/>
+              </a:rPr>
+              <a:t>Power. For testing we used a power adapter which limited the robots movement. Rechargeable would be more suited to the task.</a:t>
+            </a:r>
+            <a:endParaRPr>
+              <a:latin typeface="Times New Roman"/>
+              <a:cs typeface="Times New Roman"/>
+            </a:endParaRPr>
+          </a:p>
+        </p:txBody>
+      </p:sp>
+    </p:spTree>
+  </p:cSld>
+  <p:clrMapOvr>
+    <a:masterClrMapping/>
+  </p:clrMapOvr>
+  <mc:AlternateContent xmlns:mc="http://schemas.openxmlformats.org/markup-compatibility/2006">
+    <mc:Choice xmlns:p14="http://schemas.microsoft.com/office/powerpoint/2010/main" Requires="p14">
+      <p:transition p14:dur="2000" advClick="1"/>
+    </mc:Choice>
+    <mc:Fallback>
+      <p:transition advClick="1"/>
+    </mc:Fallback>
+  </mc:AlternateContent>
+</p:sld>
+</file>
+
+<file path=ppt/slides/slide6.xml><?xml version="1.0" encoding="utf-8"?>
 <p:sld xmlns:a="http://schemas.openxmlformats.org/drawingml/2006/main" xmlns:r="http://schemas.openxmlformats.org/officeDocument/2006/relationships" xmlns:p="http://schemas.openxmlformats.org/presentationml/2006/main" xmlns:m="http://schemas.openxmlformats.org/officeDocument/2006/math" xmlns:w="http://schemas.openxmlformats.org/wordprocessingml/2006/main" showMasterPhAnim="0" show="1">
   <p:cSld name="">
     <p:spTree>

</xml_diff>